<commit_message>
add link for video 2
</commit_message>
<xml_diff>
--- a/Slides/Slides for Video 1_Introduction to the Workshop.pptx
+++ b/Slides/Slides for Video 1_Introduction to the Workshop.pptx
@@ -217,7 +217,7 @@
           <a:p>
             <a:fld id="{B691E1BE-C8AD-4C3C-8D6E-54E179670970}" type="datetimeFigureOut">
               <a:rPr lang="en-US" smtClean="0"/>
-              <a:t>11/29/2021</a:t>
+              <a:t>12/8/2021</a:t>
             </a:fld>
             <a:endParaRPr lang="en-US"/>
           </a:p>
@@ -613,7 +613,7 @@
           <a:p>
             <a:fld id="{6B17B2C3-D005-452D-B422-053E0D6EE76F}" type="datetimeFigureOut">
               <a:rPr lang="en-US" smtClean="0"/>
-              <a:t>11/29/2021</a:t>
+              <a:t>12/8/2021</a:t>
             </a:fld>
             <a:endParaRPr lang="en-US"/>
           </a:p>
@@ -824,7 +824,7 @@
           <a:p>
             <a:fld id="{6B17B2C3-D005-452D-B422-053E0D6EE76F}" type="datetimeFigureOut">
               <a:rPr lang="en-US" smtClean="0"/>
-              <a:t>11/29/2021</a:t>
+              <a:t>12/8/2021</a:t>
             </a:fld>
             <a:endParaRPr lang="en-US"/>
           </a:p>
@@ -1002,7 +1002,7 @@
           <a:p>
             <a:fld id="{6B17B2C3-D005-452D-B422-053E0D6EE76F}" type="datetimeFigureOut">
               <a:rPr lang="en-US" smtClean="0"/>
-              <a:t>11/29/2021</a:t>
+              <a:t>12/8/2021</a:t>
             </a:fld>
             <a:endParaRPr lang="en-US"/>
           </a:p>
@@ -1170,7 +1170,7 @@
           <a:p>
             <a:fld id="{6B17B2C3-D005-452D-B422-053E0D6EE76F}" type="datetimeFigureOut">
               <a:rPr lang="en-US" smtClean="0"/>
-              <a:t>11/29/2021</a:t>
+              <a:t>12/8/2021</a:t>
             </a:fld>
             <a:endParaRPr lang="en-US"/>
           </a:p>
@@ -1500,7 +1500,7 @@
           <a:p>
             <a:fld id="{6B17B2C3-D005-452D-B422-053E0D6EE76F}" type="datetimeFigureOut">
               <a:rPr lang="en-US" smtClean="0"/>
-              <a:t>11/29/2021</a:t>
+              <a:t>12/8/2021</a:t>
             </a:fld>
             <a:endParaRPr lang="en-US"/>
           </a:p>
@@ -1772,7 +1772,7 @@
           <a:p>
             <a:fld id="{6B17B2C3-D005-452D-B422-053E0D6EE76F}" type="datetimeFigureOut">
               <a:rPr lang="en-US" smtClean="0"/>
-              <a:t>11/29/2021</a:t>
+              <a:t>12/8/2021</a:t>
             </a:fld>
             <a:endParaRPr lang="en-US"/>
           </a:p>
@@ -2179,7 +2179,7 @@
           <a:p>
             <a:fld id="{6B17B2C3-D005-452D-B422-053E0D6EE76F}" type="datetimeFigureOut">
               <a:rPr lang="en-US" smtClean="0"/>
-              <a:t>11/29/2021</a:t>
+              <a:t>12/8/2021</a:t>
             </a:fld>
             <a:endParaRPr lang="en-US"/>
           </a:p>
@@ -2339,7 +2339,7 @@
           <a:p>
             <a:fld id="{6B17B2C3-D005-452D-B422-053E0D6EE76F}" type="datetimeFigureOut">
               <a:rPr lang="en-US" smtClean="0"/>
-              <a:t>11/29/2021</a:t>
+              <a:t>12/8/2021</a:t>
             </a:fld>
             <a:endParaRPr lang="en-US"/>
           </a:p>
@@ -2477,7 +2477,7 @@
           <a:p>
             <a:fld id="{6B17B2C3-D005-452D-B422-053E0D6EE76F}" type="datetimeFigureOut">
               <a:rPr lang="en-US" smtClean="0"/>
-              <a:t>11/29/2021</a:t>
+              <a:t>12/8/2021</a:t>
             </a:fld>
             <a:endParaRPr lang="en-US"/>
           </a:p>
@@ -2795,7 +2795,7 @@
           <a:p>
             <a:fld id="{6B17B2C3-D005-452D-B422-053E0D6EE76F}" type="datetimeFigureOut">
               <a:rPr lang="en-US" smtClean="0"/>
-              <a:t>11/29/2021</a:t>
+              <a:t>12/8/2021</a:t>
             </a:fld>
             <a:endParaRPr lang="en-US"/>
           </a:p>
@@ -3090,7 +3090,7 @@
           <a:p>
             <a:fld id="{6B17B2C3-D005-452D-B422-053E0D6EE76F}" type="datetimeFigureOut">
               <a:rPr lang="en-US" smtClean="0"/>
-              <a:t>11/29/2021</a:t>
+              <a:t>12/8/2021</a:t>
             </a:fld>
             <a:endParaRPr lang="en-US"/>
           </a:p>
@@ -3344,7 +3344,7 @@
           <a:p>
             <a:fld id="{6B17B2C3-D005-452D-B422-053E0D6EE76F}" type="datetimeFigureOut">
               <a:rPr lang="en-US" smtClean="0"/>
-              <a:t>11/29/2021</a:t>
+              <a:t>12/8/2021</a:t>
             </a:fld>
             <a:endParaRPr lang="en-US"/>
           </a:p>
@@ -4161,6 +4161,12 @@
           <a:p>
             <a:r>
               <a:rPr lang="en-US" dirty="0"/>
+              <a:t>Course website: VaccineEvaluationWorkshop.github.io</a:t>
+            </a:r>
+          </a:p>
+          <a:p>
+            <a:r>
+              <a:rPr lang="en-US" dirty="0"/>
               <a:t>Draft guidance document from WHO on vaccine evaluation</a:t>
             </a:r>
           </a:p>
@@ -4170,7 +4176,7 @@
             </a:pPr>
             <a:r>
               <a:rPr lang="en-US" dirty="0"/>
-              <a:t>	https://danweinberger.github.io/who-guidance-materials</a:t>
+              <a:t>	http://guidance.interventionevaluatr.com</a:t>
             </a:r>
           </a:p>
         </p:txBody>
@@ -4251,13 +4257,13 @@
         </p:nvSpPr>
         <p:spPr>
           <a:xfrm>
-            <a:off x="416170" y="1690688"/>
-            <a:ext cx="11038952" cy="4351338"/>
+            <a:off x="0" y="1690688"/>
+            <a:ext cx="11611707" cy="4790499"/>
           </a:xfrm>
         </p:spPr>
         <p:txBody>
           <a:bodyPr>
-            <a:normAutofit lnSpcReduction="10000"/>
+            <a:normAutofit fontScale="70000" lnSpcReduction="20000"/>
           </a:bodyPr>
           <a:lstStyle/>
           <a:p>
@@ -4349,6 +4355,73 @@
             <a:r>
               <a:rPr lang="en-US" dirty="0"/>
               <a:t> Mohammed (MRC/The Gambia)</a:t>
+            </a:r>
+          </a:p>
+          <a:p>
+            <a:pPr marL="1543050"/>
+            <a:r>
+              <a:rPr lang="en-US" dirty="0"/>
+              <a:t>Iris </a:t>
+            </a:r>
+            <a:r>
+              <a:rPr lang="en-US" dirty="0" err="1"/>
+              <a:t>Artin</a:t>
+            </a:r>
+            <a:r>
+              <a:rPr lang="en-US" dirty="0"/>
+              <a:t>(Yale)</a:t>
+            </a:r>
+          </a:p>
+          <a:p>
+            <a:pPr marL="1543050"/>
+            <a:r>
+              <a:rPr lang="en-US" dirty="0"/>
+              <a:t>Lone Simonsen (Roskilde)</a:t>
+            </a:r>
+          </a:p>
+          <a:p>
+            <a:pPr marL="1543050"/>
+            <a:r>
+              <a:rPr lang="en-US" dirty="0"/>
+              <a:t>Rob Taylor (Sage </a:t>
+            </a:r>
+            <a:r>
+              <a:rPr lang="en-US" dirty="0" err="1"/>
+              <a:t>Analytica</a:t>
+            </a:r>
+            <a:r>
+              <a:rPr lang="en-US" dirty="0"/>
+              <a:t>)</a:t>
+            </a:r>
+          </a:p>
+          <a:p>
+            <a:pPr marL="1543050"/>
+            <a:r>
+              <a:rPr lang="en-US" dirty="0"/>
+              <a:t>Christian Bruhn (Yale)</a:t>
+            </a:r>
+          </a:p>
+          <a:p>
+            <a:pPr marL="1543050"/>
+            <a:r>
+              <a:rPr lang="en-US" dirty="0"/>
+              <a:t>The WHO working group on the use of administrative data to evaluate PCV impact (Fernanda </a:t>
+            </a:r>
+            <a:r>
+              <a:rPr lang="en-US" dirty="0" err="1"/>
+              <a:t>Lessa</a:t>
+            </a:r>
+            <a:r>
+              <a:rPr lang="en-US" dirty="0"/>
+              <a:t> (CDC), Jennifer Loo Farrar (CDC), </a:t>
+            </a:r>
+            <a:r>
+              <a:rPr lang="en-US" dirty="0" err="1"/>
+              <a:t>Tomoka</a:t>
+            </a:r>
+            <a:r>
+              <a:rPr lang="en-US" dirty="0"/>
+              <a:t> Nakamura (WHO), Adam Cohen (WHO/CDC))</a:t>
             </a:r>
           </a:p>
         </p:txBody>

</xml_diff>